<commit_message>
added MNIST and update to intro
</commit_message>
<xml_diff>
--- a/python.pptx
+++ b/python.pptx
@@ -11,6 +11,7 @@
     <p:sldId id="259" r:id="rId5"/>
     <p:sldId id="260" r:id="rId6"/>
     <p:sldId id="261" r:id="rId7"/>
+    <p:sldId id="262" r:id="rId8"/>
   </p:sldIdLst>
   <p:sldSz cx="12192000" cy="6858000"/>
   <p:notesSz cx="6858000" cy="9144000"/>
@@ -3659,7 +3660,7 @@
         </p:spPr>
         <p:txBody>
           <a:bodyPr vert="horz" lIns="91440" tIns="45720" rIns="91440" bIns="45720" rtlCol="0">
-            <a:normAutofit fontScale="77500" lnSpcReduction="20000"/>
+            <a:normAutofit fontScale="85000" lnSpcReduction="20000"/>
           </a:bodyPr>
           <a:lstStyle>
             <a:lvl1pPr marL="228600" indent="-228600" algn="l" defTabSz="914400" rtl="0" eaLnBrk="1" latinLnBrk="0" hangingPunct="1">
@@ -3853,7 +3854,7 @@
         </p:spPr>
         <p:txBody>
           <a:bodyPr vert="horz" lIns="91440" tIns="45720" rIns="91440" bIns="45720" rtlCol="0">
-            <a:normAutofit fontScale="77500" lnSpcReduction="20000"/>
+            <a:normAutofit fontScale="85000" lnSpcReduction="20000"/>
           </a:bodyPr>
           <a:lstStyle>
             <a:lvl1pPr marL="228600" indent="-228600" algn="l" defTabSz="914400" rtl="0" eaLnBrk="1" latinLnBrk="0" hangingPunct="1">
@@ -6119,6 +6120,103 @@
 </p:sld>
 </file>
 
+<file path=ppt/slides/slide7.xml><?xml version="1.0" encoding="utf-8"?>
+<p:sld xmlns:a="http://schemas.openxmlformats.org/drawingml/2006/main" xmlns:r="http://schemas.openxmlformats.org/officeDocument/2006/relationships" xmlns:p="http://schemas.openxmlformats.org/presentationml/2006/main">
+  <p:cSld>
+    <p:spTree>
+      <p:nvGrpSpPr>
+        <p:cNvPr id="1" name=""/>
+        <p:cNvGrpSpPr/>
+        <p:nvPr/>
+      </p:nvGrpSpPr>
+      <p:grpSpPr>
+        <a:xfrm>
+          <a:off x="0" y="0"/>
+          <a:ext cx="0" cy="0"/>
+          <a:chOff x="0" y="0"/>
+          <a:chExt cx="0" cy="0"/>
+        </a:xfrm>
+      </p:grpSpPr>
+      <p:sp>
+        <p:nvSpPr>
+          <p:cNvPr id="2" name="Titre 1"/>
+          <p:cNvSpPr>
+            <a:spLocks noGrp="1"/>
+          </p:cNvSpPr>
+          <p:nvPr>
+            <p:ph type="title"/>
+          </p:nvPr>
+        </p:nvSpPr>
+        <p:spPr/>
+        <p:txBody>
+          <a:bodyPr/>
+          <a:lstStyle/>
+          <a:p>
+            <a:r>
+              <a:rPr lang="en-US" dirty="0" smtClean="0"/>
+              <a:t>References	</a:t>
+            </a:r>
+            <a:endParaRPr lang="en-US" dirty="0"/>
+          </a:p>
+        </p:txBody>
+      </p:sp>
+      <p:sp>
+        <p:nvSpPr>
+          <p:cNvPr id="3" name="Espace réservé du contenu 2"/>
+          <p:cNvSpPr>
+            <a:spLocks noGrp="1"/>
+          </p:cNvSpPr>
+          <p:nvPr>
+            <p:ph idx="1"/>
+          </p:nvPr>
+        </p:nvSpPr>
+        <p:spPr/>
+        <p:txBody>
+          <a:bodyPr/>
+          <a:lstStyle/>
+          <a:p>
+            <a:r>
+              <a:rPr lang="en-US" dirty="0" smtClean="0"/>
+              <a:t>An Excellent </a:t>
+            </a:r>
+            <a:r>
+              <a:rPr lang="en-US" dirty="0" err="1" smtClean="0"/>
+              <a:t>Jupyter</a:t>
+            </a:r>
+            <a:r>
+              <a:rPr lang="en-US" smtClean="0"/>
+              <a:t> </a:t>
+            </a:r>
+            <a:r>
+              <a:rPr lang="en-US" dirty="0" smtClean="0"/>
+              <a:t>demo at </a:t>
+            </a:r>
+            <a:r>
+              <a:rPr lang="en-US" smtClean="0">
+                <a:hlinkClick r:id="rId2"/>
+              </a:rPr>
+              <a:t>scipy-2018 conference</a:t>
+            </a:r>
+            <a:endParaRPr lang="en-US" smtClean="0"/>
+          </a:p>
+          <a:p>
+            <a:endParaRPr lang="en-US" dirty="0" smtClean="0"/>
+          </a:p>
+        </p:txBody>
+      </p:sp>
+    </p:spTree>
+    <p:extLst>
+      <p:ext uri="{BB962C8B-B14F-4D97-AF65-F5344CB8AC3E}">
+        <p14:creationId xmlns:p14="http://schemas.microsoft.com/office/powerpoint/2010/main" val="2606252458"/>
+      </p:ext>
+    </p:extLst>
+  </p:cSld>
+  <p:clrMapOvr>
+    <a:masterClrMapping/>
+  </p:clrMapOvr>
+</p:sld>
+</file>
+
 <file path=ppt/theme/theme1.xml><?xml version="1.0" encoding="utf-8"?>
 <a:theme xmlns:a="http://schemas.openxmlformats.org/drawingml/2006/main" name="Thème Office">
   <a:themeElements>

</xml_diff>

<commit_message>
las commit before course
</commit_message>
<xml_diff>
--- a/python.pptx
+++ b/python.pptx
@@ -249,7 +249,7 @@
           <a:p>
             <a:fld id="{0B02A508-83A4-4980-9DF3-6E40FA491A04}" type="datetimeFigureOut">
               <a:rPr lang="en-US" smtClean="0"/>
-              <a:t>06-Dec-18</a:t>
+              <a:t>14-Jan-19</a:t>
             </a:fld>
             <a:endParaRPr lang="en-US"/>
           </a:p>
@@ -419,7 +419,7 @@
           <a:p>
             <a:fld id="{0B02A508-83A4-4980-9DF3-6E40FA491A04}" type="datetimeFigureOut">
               <a:rPr lang="en-US" smtClean="0"/>
-              <a:t>06-Dec-18</a:t>
+              <a:t>14-Jan-19</a:t>
             </a:fld>
             <a:endParaRPr lang="en-US"/>
           </a:p>
@@ -599,7 +599,7 @@
           <a:p>
             <a:fld id="{0B02A508-83A4-4980-9DF3-6E40FA491A04}" type="datetimeFigureOut">
               <a:rPr lang="en-US" smtClean="0"/>
-              <a:t>06-Dec-18</a:t>
+              <a:t>14-Jan-19</a:t>
             </a:fld>
             <a:endParaRPr lang="en-US"/>
           </a:p>
@@ -769,7 +769,7 @@
           <a:p>
             <a:fld id="{0B02A508-83A4-4980-9DF3-6E40FA491A04}" type="datetimeFigureOut">
               <a:rPr lang="en-US" smtClean="0"/>
-              <a:t>06-Dec-18</a:t>
+              <a:t>14-Jan-19</a:t>
             </a:fld>
             <a:endParaRPr lang="en-US"/>
           </a:p>
@@ -1015,7 +1015,7 @@
           <a:p>
             <a:fld id="{0B02A508-83A4-4980-9DF3-6E40FA491A04}" type="datetimeFigureOut">
               <a:rPr lang="en-US" smtClean="0"/>
-              <a:t>06-Dec-18</a:t>
+              <a:t>14-Jan-19</a:t>
             </a:fld>
             <a:endParaRPr lang="en-US"/>
           </a:p>
@@ -1247,7 +1247,7 @@
           <a:p>
             <a:fld id="{0B02A508-83A4-4980-9DF3-6E40FA491A04}" type="datetimeFigureOut">
               <a:rPr lang="en-US" smtClean="0"/>
-              <a:t>06-Dec-18</a:t>
+              <a:t>14-Jan-19</a:t>
             </a:fld>
             <a:endParaRPr lang="en-US"/>
           </a:p>
@@ -1614,7 +1614,7 @@
           <a:p>
             <a:fld id="{0B02A508-83A4-4980-9DF3-6E40FA491A04}" type="datetimeFigureOut">
               <a:rPr lang="en-US" smtClean="0"/>
-              <a:t>06-Dec-18</a:t>
+              <a:t>14-Jan-19</a:t>
             </a:fld>
             <a:endParaRPr lang="en-US"/>
           </a:p>
@@ -1732,7 +1732,7 @@
           <a:p>
             <a:fld id="{0B02A508-83A4-4980-9DF3-6E40FA491A04}" type="datetimeFigureOut">
               <a:rPr lang="en-US" smtClean="0"/>
-              <a:t>06-Dec-18</a:t>
+              <a:t>14-Jan-19</a:t>
             </a:fld>
             <a:endParaRPr lang="en-US"/>
           </a:p>
@@ -1827,7 +1827,7 @@
           <a:p>
             <a:fld id="{0B02A508-83A4-4980-9DF3-6E40FA491A04}" type="datetimeFigureOut">
               <a:rPr lang="en-US" smtClean="0"/>
-              <a:t>06-Dec-18</a:t>
+              <a:t>14-Jan-19</a:t>
             </a:fld>
             <a:endParaRPr lang="en-US"/>
           </a:p>
@@ -2104,7 +2104,7 @@
           <a:p>
             <a:fld id="{0B02A508-83A4-4980-9DF3-6E40FA491A04}" type="datetimeFigureOut">
               <a:rPr lang="en-US" smtClean="0"/>
-              <a:t>06-Dec-18</a:t>
+              <a:t>14-Jan-19</a:t>
             </a:fld>
             <a:endParaRPr lang="en-US"/>
           </a:p>
@@ -2357,7 +2357,7 @@
           <a:p>
             <a:fld id="{0B02A508-83A4-4980-9DF3-6E40FA491A04}" type="datetimeFigureOut">
               <a:rPr lang="en-US" smtClean="0"/>
-              <a:t>06-Dec-18</a:t>
+              <a:t>14-Jan-19</a:t>
             </a:fld>
             <a:endParaRPr lang="en-US"/>
           </a:p>
@@ -2570,7 +2570,7 @@
           <a:p>
             <a:fld id="{0B02A508-83A4-4980-9DF3-6E40FA491A04}" type="datetimeFigureOut">
               <a:rPr lang="en-US" smtClean="0"/>
-              <a:t>06-Dec-18</a:t>
+              <a:t>14-Jan-19</a:t>
             </a:fld>
             <a:endParaRPr lang="en-US"/>
           </a:p>
@@ -6184,22 +6184,28 @@
               <a:t>Jupyter</a:t>
             </a:r>
             <a:r>
-              <a:rPr lang="en-US" smtClean="0"/>
-              <a:t> </a:t>
-            </a:r>
-            <a:r>
               <a:rPr lang="en-US" dirty="0" smtClean="0"/>
-              <a:t>demo at </a:t>
-            </a:r>
-            <a:r>
-              <a:rPr lang="en-US" smtClean="0">
+              <a:t> demo at </a:t>
+            </a:r>
+            <a:r>
+              <a:rPr lang="en-US" dirty="0" smtClean="0">
                 <a:hlinkClick r:id="rId2"/>
               </a:rPr>
               <a:t>scipy-2018 conference</a:t>
             </a:r>
-            <a:endParaRPr lang="en-US" smtClean="0"/>
-          </a:p>
-          <a:p>
+            <a:endParaRPr lang="en-US" dirty="0" smtClean="0"/>
+          </a:p>
+          <a:p>
+            <a:r>
+              <a:rPr lang="en-US" dirty="0" smtClean="0"/>
+              <a:t>Everything @ </a:t>
+            </a:r>
+            <a:r>
+              <a:rPr lang="en-US" dirty="0" smtClean="0">
+                <a:hlinkClick r:id="rId3"/>
+              </a:rPr>
+              <a:t>fast.ai</a:t>
+            </a:r>
             <a:endParaRPr lang="en-US" dirty="0" smtClean="0"/>
           </a:p>
         </p:txBody>

</xml_diff>